<commit_message>
Narrated some of the overview videos
</commit_message>
<xml_diff>
--- a/PowerPoints/Phase 2 - Overview/004 An Overview of Member Eligibility Data.pptx
+++ b/PowerPoints/Phase 2 - Overview/004 An Overview of Member Eligibility Data.pptx
@@ -110,6 +110,22 @@
       </a:defRPr>
     </a:lvl9pPr>
   </p:defaultTextStyle>
+  <p:extLst>
+    <p:ext uri="{EFAFB233-063F-42B5-8137-9DF3F51BA10A}">
+      <p15:sldGuideLst xmlns:p15="http://schemas.microsoft.com/office/powerpoint/2012/main">
+        <p15:guide id="1" orient="horz" pos="2160">
+          <p15:clr>
+            <a:srgbClr val="A4A3A4"/>
+          </p15:clr>
+        </p15:guide>
+        <p15:guide id="2" pos="3840">
+          <p15:clr>
+            <a:srgbClr val="A4A3A4"/>
+          </p15:clr>
+        </p15:guide>
+      </p15:sldGuideLst>
+    </p:ext>
+  </p:extLst>
 </p:presentation>
 </file>
 
@@ -157,7 +173,7 @@
           </a:lstStyle>
           <a:p>
             <a:r>
-              <a:rPr lang="en-US" smtClean="0"/>
+              <a:rPr lang="en-US"/>
               <a:t>Click to edit Master title style</a:t>
             </a:r>
             <a:endParaRPr lang="en-US" dirty="0"/>
@@ -231,7 +247,7 @@
           </a:lstStyle>
           <a:p>
             <a:r>
-              <a:rPr lang="en-US" smtClean="0"/>
+              <a:rPr lang="en-US"/>
               <a:t>Click to edit Master subtitle style</a:t>
             </a:r>
             <a:endParaRPr lang="en-US" dirty="0"/>
@@ -255,7 +271,7 @@
           <a:p>
             <a:fld id="{FF632088-7E42-4B13-8645-6CA4616862AF}" type="datetimeFigureOut">
               <a:rPr lang="en-US" smtClean="0"/>
-              <a:t>2/29/2016</a:t>
+              <a:t>3/1/2016</a:t>
             </a:fld>
             <a:endParaRPr lang="en-US"/>
           </a:p>
@@ -349,10 +365,9 @@
           <a:lstStyle/>
           <a:p>
             <a:r>
-              <a:rPr lang="en-US" smtClean="0"/>
+              <a:rPr lang="en-US"/>
               <a:t>Click to edit Master title style</a:t>
             </a:r>
-            <a:endParaRPr lang="en-US"/>
           </a:p>
         </p:txBody>
       </p:sp>
@@ -373,35 +388,35 @@
           <a:p>
             <a:pPr lvl="0"/>
             <a:r>
-              <a:rPr lang="en-US" smtClean="0"/>
+              <a:rPr lang="en-US"/>
               <a:t>Edit Master text styles</a:t>
             </a:r>
           </a:p>
           <a:p>
             <a:pPr lvl="1"/>
             <a:r>
-              <a:rPr lang="en-US" smtClean="0"/>
+              <a:rPr lang="en-US"/>
               <a:t>Second level</a:t>
             </a:r>
           </a:p>
           <a:p>
             <a:pPr lvl="2"/>
             <a:r>
-              <a:rPr lang="en-US" smtClean="0"/>
+              <a:rPr lang="en-US"/>
               <a:t>Third level</a:t>
             </a:r>
           </a:p>
           <a:p>
             <a:pPr lvl="3"/>
             <a:r>
-              <a:rPr lang="en-US" smtClean="0"/>
+              <a:rPr lang="en-US"/>
               <a:t>Fourth level</a:t>
             </a:r>
           </a:p>
           <a:p>
             <a:pPr lvl="4"/>
             <a:r>
-              <a:rPr lang="en-US" smtClean="0"/>
+              <a:rPr lang="en-US"/>
               <a:t>Fifth level</a:t>
             </a:r>
             <a:endParaRPr lang="en-US" dirty="0"/>
@@ -425,7 +440,7 @@
           <a:p>
             <a:fld id="{FF632088-7E42-4B13-8645-6CA4616862AF}" type="datetimeFigureOut">
               <a:rPr lang="en-US" smtClean="0"/>
-              <a:t>2/29/2016</a:t>
+              <a:t>3/1/2016</a:t>
             </a:fld>
             <a:endParaRPr lang="en-US"/>
           </a:p>
@@ -524,10 +539,9 @@
           <a:lstStyle/>
           <a:p>
             <a:r>
-              <a:rPr lang="en-US" smtClean="0"/>
+              <a:rPr lang="en-US"/>
               <a:t>Click to edit Master title style</a:t>
             </a:r>
-            <a:endParaRPr lang="en-US"/>
           </a:p>
         </p:txBody>
       </p:sp>
@@ -553,38 +567,37 @@
           <a:p>
             <a:pPr lvl="0"/>
             <a:r>
-              <a:rPr lang="en-US" smtClean="0"/>
+              <a:rPr lang="en-US"/>
               <a:t>Edit Master text styles</a:t>
             </a:r>
           </a:p>
           <a:p>
             <a:pPr lvl="1"/>
             <a:r>
-              <a:rPr lang="en-US" smtClean="0"/>
+              <a:rPr lang="en-US"/>
               <a:t>Second level</a:t>
             </a:r>
           </a:p>
           <a:p>
             <a:pPr lvl="2"/>
             <a:r>
-              <a:rPr lang="en-US" smtClean="0"/>
+              <a:rPr lang="en-US"/>
               <a:t>Third level</a:t>
             </a:r>
           </a:p>
           <a:p>
             <a:pPr lvl="3"/>
             <a:r>
-              <a:rPr lang="en-US" smtClean="0"/>
+              <a:rPr lang="en-US"/>
               <a:t>Fourth level</a:t>
             </a:r>
           </a:p>
           <a:p>
             <a:pPr lvl="4"/>
             <a:r>
-              <a:rPr lang="en-US" smtClean="0"/>
+              <a:rPr lang="en-US"/>
               <a:t>Fifth level</a:t>
             </a:r>
-            <a:endParaRPr lang="en-US"/>
           </a:p>
         </p:txBody>
       </p:sp>
@@ -605,7 +618,7 @@
           <a:p>
             <a:fld id="{FF632088-7E42-4B13-8645-6CA4616862AF}" type="datetimeFigureOut">
               <a:rPr lang="en-US" smtClean="0"/>
-              <a:t>2/29/2016</a:t>
+              <a:t>3/1/2016</a:t>
             </a:fld>
             <a:endParaRPr lang="en-US"/>
           </a:p>
@@ -710,7 +723,7 @@
           </a:lstStyle>
           <a:p>
             <a:r>
-              <a:rPr lang="en-US" smtClean="0"/>
+              <a:rPr lang="en-US"/>
               <a:t>Click to edit Master title style</a:t>
             </a:r>
             <a:endParaRPr lang="en-US" dirty="0"/>
@@ -781,7 +794,7 @@
           </a:lstStyle>
           <a:p>
             <a:r>
-              <a:rPr lang="en-US" smtClean="0"/>
+              <a:rPr lang="en-US"/>
               <a:t>Click to edit Master subtitle style</a:t>
             </a:r>
             <a:endParaRPr lang="en-US" dirty="0"/>
@@ -805,7 +818,7 @@
           <a:p>
             <a:fld id="{FF632088-7E42-4B13-8645-6CA4616862AF}" type="datetimeFigureOut">
               <a:rPr lang="en-US" smtClean="0"/>
-              <a:t>2/29/2016</a:t>
+              <a:t>3/1/2016</a:t>
             </a:fld>
             <a:endParaRPr lang="en-US"/>
           </a:p>
@@ -946,7 +959,7 @@
           <a:lstStyle/>
           <a:p>
             <a:r>
-              <a:rPr lang="en-US" smtClean="0"/>
+              <a:rPr lang="en-US"/>
               <a:t>Click to edit Master title style</a:t>
             </a:r>
             <a:endParaRPr lang="en-US" dirty="0"/>
@@ -970,35 +983,35 @@
           <a:p>
             <a:pPr lvl="0"/>
             <a:r>
-              <a:rPr lang="en-US" smtClean="0"/>
+              <a:rPr lang="en-US"/>
               <a:t>Edit Master text styles</a:t>
             </a:r>
           </a:p>
           <a:p>
             <a:pPr lvl="1"/>
             <a:r>
-              <a:rPr lang="en-US" smtClean="0"/>
+              <a:rPr lang="en-US"/>
               <a:t>Second level</a:t>
             </a:r>
           </a:p>
           <a:p>
             <a:pPr lvl="2"/>
             <a:r>
-              <a:rPr lang="en-US" smtClean="0"/>
+              <a:rPr lang="en-US"/>
               <a:t>Third level</a:t>
             </a:r>
           </a:p>
           <a:p>
             <a:pPr lvl="3"/>
             <a:r>
-              <a:rPr lang="en-US" smtClean="0"/>
+              <a:rPr lang="en-US"/>
               <a:t>Fourth level</a:t>
             </a:r>
           </a:p>
           <a:p>
             <a:pPr lvl="4"/>
             <a:r>
-              <a:rPr lang="en-US" smtClean="0"/>
+              <a:rPr lang="en-US"/>
               <a:t>Fifth level</a:t>
             </a:r>
             <a:endParaRPr lang="en-US" dirty="0"/>
@@ -1022,7 +1035,7 @@
           <a:p>
             <a:fld id="{FF632088-7E42-4B13-8645-6CA4616862AF}" type="datetimeFigureOut">
               <a:rPr lang="en-US" smtClean="0"/>
-              <a:t>2/29/2016</a:t>
+              <a:t>3/1/2016</a:t>
             </a:fld>
             <a:endParaRPr lang="en-US"/>
           </a:p>
@@ -1164,7 +1177,7 @@
           </a:lstStyle>
           <a:p>
             <a:r>
-              <a:rPr lang="en-US" smtClean="0"/>
+              <a:rPr lang="en-US"/>
               <a:t>Click to edit Master title style</a:t>
             </a:r>
             <a:endParaRPr lang="en-US" dirty="0"/>
@@ -1284,7 +1297,7 @@
           <a:p>
             <a:pPr lvl="0"/>
             <a:r>
-              <a:rPr lang="en-US" smtClean="0"/>
+              <a:rPr lang="en-US"/>
               <a:t>Edit Master text styles</a:t>
             </a:r>
           </a:p>
@@ -1307,7 +1320,7 @@
           <a:p>
             <a:fld id="{FF632088-7E42-4B13-8645-6CA4616862AF}" type="datetimeFigureOut">
               <a:rPr lang="en-US" smtClean="0"/>
-              <a:t>2/29/2016</a:t>
+              <a:t>3/1/2016</a:t>
             </a:fld>
             <a:endParaRPr lang="en-US"/>
           </a:p>
@@ -1443,7 +1456,7 @@
           <a:lstStyle/>
           <a:p>
             <a:r>
-              <a:rPr lang="en-US" smtClean="0"/>
+              <a:rPr lang="en-US"/>
               <a:t>Click to edit Master title style</a:t>
             </a:r>
             <a:endParaRPr lang="en-US" dirty="0"/>
@@ -1472,35 +1485,35 @@
           <a:p>
             <a:pPr lvl="0"/>
             <a:r>
-              <a:rPr lang="en-US" smtClean="0"/>
+              <a:rPr lang="en-US"/>
               <a:t>Edit Master text styles</a:t>
             </a:r>
           </a:p>
           <a:p>
             <a:pPr lvl="1"/>
             <a:r>
-              <a:rPr lang="en-US" smtClean="0"/>
+              <a:rPr lang="en-US"/>
               <a:t>Second level</a:t>
             </a:r>
           </a:p>
           <a:p>
             <a:pPr lvl="2"/>
             <a:r>
-              <a:rPr lang="en-US" smtClean="0"/>
+              <a:rPr lang="en-US"/>
               <a:t>Third level</a:t>
             </a:r>
           </a:p>
           <a:p>
             <a:pPr lvl="3"/>
             <a:r>
-              <a:rPr lang="en-US" smtClean="0"/>
+              <a:rPr lang="en-US"/>
               <a:t>Fourth level</a:t>
             </a:r>
           </a:p>
           <a:p>
             <a:pPr lvl="4"/>
             <a:r>
-              <a:rPr lang="en-US" smtClean="0"/>
+              <a:rPr lang="en-US"/>
               <a:t>Fifth level</a:t>
             </a:r>
             <a:endParaRPr lang="en-US" dirty="0"/>
@@ -1529,35 +1542,35 @@
           <a:p>
             <a:pPr lvl="0"/>
             <a:r>
-              <a:rPr lang="en-US" smtClean="0"/>
+              <a:rPr lang="en-US"/>
               <a:t>Edit Master text styles</a:t>
             </a:r>
           </a:p>
           <a:p>
             <a:pPr lvl="1"/>
             <a:r>
-              <a:rPr lang="en-US" smtClean="0"/>
+              <a:rPr lang="en-US"/>
               <a:t>Second level</a:t>
             </a:r>
           </a:p>
           <a:p>
             <a:pPr lvl="2"/>
             <a:r>
-              <a:rPr lang="en-US" smtClean="0"/>
+              <a:rPr lang="en-US"/>
               <a:t>Third level</a:t>
             </a:r>
           </a:p>
           <a:p>
             <a:pPr lvl="3"/>
             <a:r>
-              <a:rPr lang="en-US" smtClean="0"/>
+              <a:rPr lang="en-US"/>
               <a:t>Fourth level</a:t>
             </a:r>
           </a:p>
           <a:p>
             <a:pPr lvl="4"/>
             <a:r>
-              <a:rPr lang="en-US" smtClean="0"/>
+              <a:rPr lang="en-US"/>
               <a:t>Fifth level</a:t>
             </a:r>
             <a:endParaRPr lang="en-US" dirty="0"/>
@@ -1581,7 +1594,7 @@
           <a:p>
             <a:fld id="{FF632088-7E42-4B13-8645-6CA4616862AF}" type="datetimeFigureOut">
               <a:rPr lang="en-US" smtClean="0"/>
-              <a:t>2/29/2016</a:t>
+              <a:t>3/1/2016</a:t>
             </a:fld>
             <a:endParaRPr lang="en-US"/>
           </a:p>
@@ -1678,7 +1691,7 @@
   </p:clrMapOvr>
   <p:extLst>
     <p:ext uri="{DCECCB84-F9BA-43D5-87BE-67443E8EF086}">
-      <p15:sldGuideLst xmlns:p15="http://schemas.microsoft.com/office/powerpoint/2012/main" xmlns=""/>
+      <p15:sldGuideLst xmlns:p15="http://schemas.microsoft.com/office/powerpoint/2012/main"/>
     </p:ext>
   </p:extLst>
 </p:sldLayout>
@@ -1722,7 +1735,7 @@
           <a:lstStyle/>
           <a:p>
             <a:r>
-              <a:rPr lang="en-US" smtClean="0"/>
+              <a:rPr lang="en-US"/>
               <a:t>Click to edit Master title style</a:t>
             </a:r>
             <a:endParaRPr lang="en-US" dirty="0"/>
@@ -1797,7 +1810,7 @@
           <a:p>
             <a:pPr lvl="0"/>
             <a:r>
-              <a:rPr lang="en-US" smtClean="0"/>
+              <a:rPr lang="en-US"/>
               <a:t>Edit Master text styles</a:t>
             </a:r>
           </a:p>
@@ -1825,35 +1838,35 @@
           <a:p>
             <a:pPr lvl="0"/>
             <a:r>
-              <a:rPr lang="en-US" smtClean="0"/>
+              <a:rPr lang="en-US"/>
               <a:t>Edit Master text styles</a:t>
             </a:r>
           </a:p>
           <a:p>
             <a:pPr lvl="1"/>
             <a:r>
-              <a:rPr lang="en-US" smtClean="0"/>
+              <a:rPr lang="en-US"/>
               <a:t>Second level</a:t>
             </a:r>
           </a:p>
           <a:p>
             <a:pPr lvl="2"/>
             <a:r>
-              <a:rPr lang="en-US" smtClean="0"/>
+              <a:rPr lang="en-US"/>
               <a:t>Third level</a:t>
             </a:r>
           </a:p>
           <a:p>
             <a:pPr lvl="3"/>
             <a:r>
-              <a:rPr lang="en-US" smtClean="0"/>
+              <a:rPr lang="en-US"/>
               <a:t>Fourth level</a:t>
             </a:r>
           </a:p>
           <a:p>
             <a:pPr lvl="4"/>
             <a:r>
-              <a:rPr lang="en-US" smtClean="0"/>
+              <a:rPr lang="en-US"/>
               <a:t>Fifth level</a:t>
             </a:r>
             <a:endParaRPr lang="en-US" dirty="0"/>
@@ -1928,7 +1941,7 @@
           <a:p>
             <a:pPr lvl="0"/>
             <a:r>
-              <a:rPr lang="en-US" smtClean="0"/>
+              <a:rPr lang="en-US"/>
               <a:t>Edit Master text styles</a:t>
             </a:r>
           </a:p>
@@ -1956,35 +1969,35 @@
           <a:p>
             <a:pPr lvl="0"/>
             <a:r>
-              <a:rPr lang="en-US" smtClean="0"/>
+              <a:rPr lang="en-US"/>
               <a:t>Edit Master text styles</a:t>
             </a:r>
           </a:p>
           <a:p>
             <a:pPr lvl="1"/>
             <a:r>
-              <a:rPr lang="en-US" smtClean="0"/>
+              <a:rPr lang="en-US"/>
               <a:t>Second level</a:t>
             </a:r>
           </a:p>
           <a:p>
             <a:pPr lvl="2"/>
             <a:r>
-              <a:rPr lang="en-US" smtClean="0"/>
+              <a:rPr lang="en-US"/>
               <a:t>Third level</a:t>
             </a:r>
           </a:p>
           <a:p>
             <a:pPr lvl="3"/>
             <a:r>
-              <a:rPr lang="en-US" smtClean="0"/>
+              <a:rPr lang="en-US"/>
               <a:t>Fourth level</a:t>
             </a:r>
           </a:p>
           <a:p>
             <a:pPr lvl="4"/>
             <a:r>
-              <a:rPr lang="en-US" smtClean="0"/>
+              <a:rPr lang="en-US"/>
               <a:t>Fifth level</a:t>
             </a:r>
             <a:endParaRPr lang="en-US" dirty="0"/>
@@ -2008,7 +2021,7 @@
           <a:p>
             <a:fld id="{FF632088-7E42-4B13-8645-6CA4616862AF}" type="datetimeFigureOut">
               <a:rPr lang="en-US" smtClean="0"/>
-              <a:t>2/29/2016</a:t>
+              <a:t>3/1/2016</a:t>
             </a:fld>
             <a:endParaRPr lang="en-US"/>
           </a:p>
@@ -2105,7 +2118,7 @@
   </p:clrMapOvr>
   <p:extLst>
     <p:ext uri="{DCECCB84-F9BA-43D5-87BE-67443E8EF086}">
-      <p15:sldGuideLst xmlns:p15="http://schemas.microsoft.com/office/powerpoint/2012/main" xmlns=""/>
+      <p15:sldGuideLst xmlns:p15="http://schemas.microsoft.com/office/powerpoint/2012/main"/>
     </p:ext>
   </p:extLst>
 </p:sldLayout>
@@ -2144,7 +2157,7 @@
           <a:lstStyle/>
           <a:p>
             <a:r>
-              <a:rPr lang="en-US" smtClean="0"/>
+              <a:rPr lang="en-US"/>
               <a:t>Click to edit Master title style</a:t>
             </a:r>
             <a:endParaRPr lang="en-US" dirty="0"/>
@@ -2168,7 +2181,7 @@
           <a:p>
             <a:fld id="{FF632088-7E42-4B13-8645-6CA4616862AF}" type="datetimeFigureOut">
               <a:rPr lang="en-US" smtClean="0"/>
-              <a:t>2/29/2016</a:t>
+              <a:t>3/1/2016</a:t>
             </a:fld>
             <a:endParaRPr lang="en-US"/>
           </a:p>
@@ -2300,7 +2313,7 @@
           <a:p>
             <a:fld id="{FF632088-7E42-4B13-8645-6CA4616862AF}" type="datetimeFigureOut">
               <a:rPr lang="en-US" smtClean="0"/>
-              <a:t>2/29/2016</a:t>
+              <a:t>3/1/2016</a:t>
             </a:fld>
             <a:endParaRPr lang="en-US"/>
           </a:p>
@@ -2405,7 +2418,7 @@
           </a:lstStyle>
           <a:p>
             <a:r>
-              <a:rPr lang="en-US" smtClean="0"/>
+              <a:rPr lang="en-US"/>
               <a:t>Click to edit Master title style</a:t>
             </a:r>
             <a:endParaRPr lang="en-US" dirty="0"/>
@@ -2434,35 +2447,35 @@
           <a:p>
             <a:pPr lvl="0"/>
             <a:r>
-              <a:rPr lang="en-US" smtClean="0"/>
+              <a:rPr lang="en-US"/>
               <a:t>Edit Master text styles</a:t>
             </a:r>
           </a:p>
           <a:p>
             <a:pPr lvl="1"/>
             <a:r>
-              <a:rPr lang="en-US" smtClean="0"/>
+              <a:rPr lang="en-US"/>
               <a:t>Second level</a:t>
             </a:r>
           </a:p>
           <a:p>
             <a:pPr lvl="2"/>
             <a:r>
-              <a:rPr lang="en-US" smtClean="0"/>
+              <a:rPr lang="en-US"/>
               <a:t>Third level</a:t>
             </a:r>
           </a:p>
           <a:p>
             <a:pPr lvl="3"/>
             <a:r>
-              <a:rPr lang="en-US" smtClean="0"/>
+              <a:rPr lang="en-US"/>
               <a:t>Fourth level</a:t>
             </a:r>
           </a:p>
           <a:p>
             <a:pPr lvl="4"/>
             <a:r>
-              <a:rPr lang="en-US" smtClean="0"/>
+              <a:rPr lang="en-US"/>
               <a:t>Fifth level</a:t>
             </a:r>
             <a:endParaRPr lang="en-US" dirty="0"/>
@@ -2528,7 +2541,7 @@
           <a:p>
             <a:pPr lvl="0"/>
             <a:r>
-              <a:rPr lang="en-US" smtClean="0"/>
+              <a:rPr lang="en-US"/>
               <a:t>Edit Master text styles</a:t>
             </a:r>
           </a:p>
@@ -2551,7 +2564,7 @@
           <a:p>
             <a:fld id="{FF632088-7E42-4B13-8645-6CA4616862AF}" type="datetimeFigureOut">
               <a:rPr lang="en-US" smtClean="0"/>
-              <a:t>2/29/2016</a:t>
+              <a:t>3/1/2016</a:t>
             </a:fld>
             <a:endParaRPr lang="en-US"/>
           </a:p>
@@ -2648,7 +2661,7 @@
   </p:clrMapOvr>
   <p:extLst>
     <p:ext uri="{DCECCB84-F9BA-43D5-87BE-67443E8EF086}">
-      <p15:sldGuideLst xmlns:p15="http://schemas.microsoft.com/office/powerpoint/2012/main" xmlns=""/>
+      <p15:sldGuideLst xmlns:p15="http://schemas.microsoft.com/office/powerpoint/2012/main"/>
     </p:ext>
   </p:extLst>
 </p:sldLayout>
@@ -2687,7 +2700,7 @@
           <a:lstStyle/>
           <a:p>
             <a:r>
-              <a:rPr lang="en-US" smtClean="0"/>
+              <a:rPr lang="en-US"/>
               <a:t>Click to edit Master title style</a:t>
             </a:r>
             <a:endParaRPr lang="en-US" dirty="0"/>
@@ -2711,35 +2724,35 @@
           <a:p>
             <a:pPr lvl="0"/>
             <a:r>
-              <a:rPr lang="en-US" smtClean="0"/>
+              <a:rPr lang="en-US"/>
               <a:t>Edit Master text styles</a:t>
             </a:r>
           </a:p>
           <a:p>
             <a:pPr lvl="1"/>
             <a:r>
-              <a:rPr lang="en-US" smtClean="0"/>
+              <a:rPr lang="en-US"/>
               <a:t>Second level</a:t>
             </a:r>
           </a:p>
           <a:p>
             <a:pPr lvl="2"/>
             <a:r>
-              <a:rPr lang="en-US" smtClean="0"/>
+              <a:rPr lang="en-US"/>
               <a:t>Third level</a:t>
             </a:r>
           </a:p>
           <a:p>
             <a:pPr lvl="3"/>
             <a:r>
-              <a:rPr lang="en-US" smtClean="0"/>
+              <a:rPr lang="en-US"/>
               <a:t>Fourth level</a:t>
             </a:r>
           </a:p>
           <a:p>
             <a:pPr lvl="4"/>
             <a:r>
-              <a:rPr lang="en-US" smtClean="0"/>
+              <a:rPr lang="en-US"/>
               <a:t>Fifth level</a:t>
             </a:r>
             <a:endParaRPr lang="en-US" dirty="0"/>
@@ -2763,7 +2776,7 @@
           <a:p>
             <a:fld id="{FF632088-7E42-4B13-8645-6CA4616862AF}" type="datetimeFigureOut">
               <a:rPr lang="en-US" smtClean="0"/>
-              <a:t>2/29/2016</a:t>
+              <a:t>3/1/2016</a:t>
             </a:fld>
             <a:endParaRPr lang="en-US"/>
           </a:p>
@@ -3006,7 +3019,7 @@
           </a:lstStyle>
           <a:p>
             <a:r>
-              <a:rPr lang="en-US" smtClean="0"/>
+              <a:rPr lang="en-US"/>
               <a:t>Click to edit Master title style</a:t>
             </a:r>
             <a:endParaRPr lang="en-US" dirty="0"/>
@@ -3081,7 +3094,7 @@
           </a:lstStyle>
           <a:p>
             <a:r>
-              <a:rPr lang="en-US" smtClean="0"/>
+              <a:rPr lang="en-US"/>
               <a:t>Click icon to add picture</a:t>
             </a:r>
             <a:endParaRPr lang="en-US" dirty="0"/>
@@ -3149,7 +3162,7 @@
           <a:p>
             <a:pPr lvl="0"/>
             <a:r>
-              <a:rPr lang="en-US" smtClean="0"/>
+              <a:rPr lang="en-US"/>
               <a:t>Edit Master text styles</a:t>
             </a:r>
           </a:p>
@@ -3181,7 +3194,7 @@
           <a:p>
             <a:fld id="{FF632088-7E42-4B13-8645-6CA4616862AF}" type="datetimeFigureOut">
               <a:rPr lang="en-US" smtClean="0"/>
-              <a:t>2/29/2016</a:t>
+              <a:t>3/1/2016</a:t>
             </a:fld>
             <a:endParaRPr lang="en-US"/>
           </a:p>
@@ -3317,7 +3330,7 @@
           <a:lstStyle/>
           <a:p>
             <a:r>
-              <a:rPr lang="en-US" smtClean="0"/>
+              <a:rPr lang="en-US"/>
               <a:t>Click to edit Master title style</a:t>
             </a:r>
             <a:endParaRPr lang="en-US" dirty="0"/>
@@ -3341,35 +3354,35 @@
           <a:p>
             <a:pPr lvl="0"/>
             <a:r>
-              <a:rPr lang="en-US" smtClean="0"/>
+              <a:rPr lang="en-US"/>
               <a:t>Edit Master text styles</a:t>
             </a:r>
           </a:p>
           <a:p>
             <a:pPr lvl="1"/>
             <a:r>
-              <a:rPr lang="en-US" smtClean="0"/>
+              <a:rPr lang="en-US"/>
               <a:t>Second level</a:t>
             </a:r>
           </a:p>
           <a:p>
             <a:pPr lvl="2"/>
             <a:r>
-              <a:rPr lang="en-US" smtClean="0"/>
+              <a:rPr lang="en-US"/>
               <a:t>Third level</a:t>
             </a:r>
           </a:p>
           <a:p>
             <a:pPr lvl="3"/>
             <a:r>
-              <a:rPr lang="en-US" smtClean="0"/>
+              <a:rPr lang="en-US"/>
               <a:t>Fourth level</a:t>
             </a:r>
           </a:p>
           <a:p>
             <a:pPr lvl="4"/>
             <a:r>
-              <a:rPr lang="en-US" smtClean="0"/>
+              <a:rPr lang="en-US"/>
               <a:t>Fifth level</a:t>
             </a:r>
             <a:endParaRPr lang="en-US" dirty="0"/>
@@ -3393,7 +3406,7 @@
           <a:p>
             <a:fld id="{FF632088-7E42-4B13-8645-6CA4616862AF}" type="datetimeFigureOut">
               <a:rPr lang="en-US" smtClean="0"/>
-              <a:t>2/29/2016</a:t>
+              <a:t>3/1/2016</a:t>
             </a:fld>
             <a:endParaRPr lang="en-US"/>
           </a:p>
@@ -3533,7 +3546,7 @@
           </a:lstStyle>
           <a:p>
             <a:r>
-              <a:rPr lang="en-US" smtClean="0"/>
+              <a:rPr lang="en-US"/>
               <a:t>Click to edit Master title style</a:t>
             </a:r>
             <a:endParaRPr lang="en-US" dirty="0"/>
@@ -3562,35 +3575,35 @@
           <a:p>
             <a:pPr lvl="0"/>
             <a:r>
-              <a:rPr lang="en-US" smtClean="0"/>
+              <a:rPr lang="en-US"/>
               <a:t>Edit Master text styles</a:t>
             </a:r>
           </a:p>
           <a:p>
             <a:pPr lvl="1"/>
             <a:r>
-              <a:rPr lang="en-US" smtClean="0"/>
+              <a:rPr lang="en-US"/>
               <a:t>Second level</a:t>
             </a:r>
           </a:p>
           <a:p>
             <a:pPr lvl="2"/>
             <a:r>
-              <a:rPr lang="en-US" smtClean="0"/>
+              <a:rPr lang="en-US"/>
               <a:t>Third level</a:t>
             </a:r>
           </a:p>
           <a:p>
             <a:pPr lvl="3"/>
             <a:r>
-              <a:rPr lang="en-US" smtClean="0"/>
+              <a:rPr lang="en-US"/>
               <a:t>Fourth level</a:t>
             </a:r>
           </a:p>
           <a:p>
             <a:pPr lvl="4"/>
             <a:r>
-              <a:rPr lang="en-US" smtClean="0"/>
+              <a:rPr lang="en-US"/>
               <a:t>Fifth level</a:t>
             </a:r>
             <a:endParaRPr lang="en-US" dirty="0"/>
@@ -3614,7 +3627,7 @@
           <a:p>
             <a:fld id="{FF632088-7E42-4B13-8645-6CA4616862AF}" type="datetimeFigureOut">
               <a:rPr lang="en-US" smtClean="0"/>
-              <a:t>2/29/2016</a:t>
+              <a:t>3/1/2016</a:t>
             </a:fld>
             <a:endParaRPr lang="en-US"/>
           </a:p>
@@ -3756,7 +3769,7 @@
           </a:lstStyle>
           <a:p>
             <a:r>
-              <a:rPr lang="en-US" smtClean="0"/>
+              <a:rPr lang="en-US"/>
               <a:t>Click to edit Master title style</a:t>
             </a:r>
             <a:endParaRPr lang="en-US" dirty="0"/>
@@ -3879,7 +3892,7 @@
           <a:p>
             <a:pPr lvl="0"/>
             <a:r>
-              <a:rPr lang="en-US" smtClean="0"/>
+              <a:rPr lang="en-US"/>
               <a:t>Edit Master text styles</a:t>
             </a:r>
           </a:p>
@@ -3902,7 +3915,7 @@
           <a:p>
             <a:fld id="{FF632088-7E42-4B13-8645-6CA4616862AF}" type="datetimeFigureOut">
               <a:rPr lang="en-US" smtClean="0"/>
-              <a:t>2/29/2016</a:t>
+              <a:t>3/1/2016</a:t>
             </a:fld>
             <a:endParaRPr lang="en-US"/>
           </a:p>
@@ -3996,7 +4009,7 @@
           <a:lstStyle/>
           <a:p>
             <a:r>
-              <a:rPr lang="en-US" smtClean="0"/>
+              <a:rPr lang="en-US"/>
               <a:t>Click to edit Master title style</a:t>
             </a:r>
             <a:endParaRPr lang="en-US" dirty="0"/>
@@ -4025,35 +4038,35 @@
           <a:p>
             <a:pPr lvl="0"/>
             <a:r>
-              <a:rPr lang="en-US" smtClean="0"/>
+              <a:rPr lang="en-US"/>
               <a:t>Edit Master text styles</a:t>
             </a:r>
           </a:p>
           <a:p>
             <a:pPr lvl="1"/>
             <a:r>
-              <a:rPr lang="en-US" smtClean="0"/>
+              <a:rPr lang="en-US"/>
               <a:t>Second level</a:t>
             </a:r>
           </a:p>
           <a:p>
             <a:pPr lvl="2"/>
             <a:r>
-              <a:rPr lang="en-US" smtClean="0"/>
+              <a:rPr lang="en-US"/>
               <a:t>Third level</a:t>
             </a:r>
           </a:p>
           <a:p>
             <a:pPr lvl="3"/>
             <a:r>
-              <a:rPr lang="en-US" smtClean="0"/>
+              <a:rPr lang="en-US"/>
               <a:t>Fourth level</a:t>
             </a:r>
           </a:p>
           <a:p>
             <a:pPr lvl="4"/>
             <a:r>
-              <a:rPr lang="en-US" smtClean="0"/>
+              <a:rPr lang="en-US"/>
               <a:t>Fifth level</a:t>
             </a:r>
             <a:endParaRPr lang="en-US" dirty="0"/>
@@ -4082,35 +4095,35 @@
           <a:p>
             <a:pPr lvl="0"/>
             <a:r>
-              <a:rPr lang="en-US" smtClean="0"/>
+              <a:rPr lang="en-US"/>
               <a:t>Edit Master text styles</a:t>
             </a:r>
           </a:p>
           <a:p>
             <a:pPr lvl="1"/>
             <a:r>
-              <a:rPr lang="en-US" smtClean="0"/>
+              <a:rPr lang="en-US"/>
               <a:t>Second level</a:t>
             </a:r>
           </a:p>
           <a:p>
             <a:pPr lvl="2"/>
             <a:r>
-              <a:rPr lang="en-US" smtClean="0"/>
+              <a:rPr lang="en-US"/>
               <a:t>Third level</a:t>
             </a:r>
           </a:p>
           <a:p>
             <a:pPr lvl="3"/>
             <a:r>
-              <a:rPr lang="en-US" smtClean="0"/>
+              <a:rPr lang="en-US"/>
               <a:t>Fourth level</a:t>
             </a:r>
           </a:p>
           <a:p>
             <a:pPr lvl="4"/>
             <a:r>
-              <a:rPr lang="en-US" smtClean="0"/>
+              <a:rPr lang="en-US"/>
               <a:t>Fifth level</a:t>
             </a:r>
             <a:endParaRPr lang="en-US" dirty="0"/>
@@ -4134,7 +4147,7 @@
           <a:p>
             <a:fld id="{FF632088-7E42-4B13-8645-6CA4616862AF}" type="datetimeFigureOut">
               <a:rPr lang="en-US" smtClean="0"/>
-              <a:t>2/29/2016</a:t>
+              <a:t>3/1/2016</a:t>
             </a:fld>
             <a:endParaRPr lang="en-US"/>
           </a:p>
@@ -4194,7 +4207,7 @@
   </p:clrMapOvr>
   <p:extLst>
     <p:ext uri="{DCECCB84-F9BA-43D5-87BE-67443E8EF086}">
-      <p15:sldGuideLst xmlns:p15="http://schemas.microsoft.com/office/powerpoint/2012/main" xmlns=""/>
+      <p15:sldGuideLst xmlns:p15="http://schemas.microsoft.com/office/powerpoint/2012/main"/>
     </p:ext>
   </p:extLst>
 </p:sldLayout>
@@ -4281,7 +4294,7 @@
           <a:p>
             <a:pPr lvl="0"/>
             <a:r>
-              <a:rPr lang="en-US" smtClean="0"/>
+              <a:rPr lang="en-US"/>
               <a:t>Edit Master text styles</a:t>
             </a:r>
           </a:p>
@@ -4309,35 +4322,35 @@
           <a:p>
             <a:pPr lvl="0"/>
             <a:r>
-              <a:rPr lang="en-US" smtClean="0"/>
+              <a:rPr lang="en-US"/>
               <a:t>Edit Master text styles</a:t>
             </a:r>
           </a:p>
           <a:p>
             <a:pPr lvl="1"/>
             <a:r>
-              <a:rPr lang="en-US" smtClean="0"/>
+              <a:rPr lang="en-US"/>
               <a:t>Second level</a:t>
             </a:r>
           </a:p>
           <a:p>
             <a:pPr lvl="2"/>
             <a:r>
-              <a:rPr lang="en-US" smtClean="0"/>
+              <a:rPr lang="en-US"/>
               <a:t>Third level</a:t>
             </a:r>
           </a:p>
           <a:p>
             <a:pPr lvl="3"/>
             <a:r>
-              <a:rPr lang="en-US" smtClean="0"/>
+              <a:rPr lang="en-US"/>
               <a:t>Fourth level</a:t>
             </a:r>
           </a:p>
           <a:p>
             <a:pPr lvl="4"/>
             <a:r>
-              <a:rPr lang="en-US" smtClean="0"/>
+              <a:rPr lang="en-US"/>
               <a:t>Fifth level</a:t>
             </a:r>
             <a:endParaRPr lang="en-US" dirty="0"/>
@@ -4406,7 +4419,7 @@
           <a:p>
             <a:pPr lvl="0"/>
             <a:r>
-              <a:rPr lang="en-US" smtClean="0"/>
+              <a:rPr lang="en-US"/>
               <a:t>Edit Master text styles</a:t>
             </a:r>
           </a:p>
@@ -4434,38 +4447,37 @@
           <a:p>
             <a:pPr lvl="0"/>
             <a:r>
-              <a:rPr lang="en-US" smtClean="0"/>
+              <a:rPr lang="en-US"/>
               <a:t>Edit Master text styles</a:t>
             </a:r>
           </a:p>
           <a:p>
             <a:pPr lvl="1"/>
             <a:r>
-              <a:rPr lang="en-US" smtClean="0"/>
+              <a:rPr lang="en-US"/>
               <a:t>Second level</a:t>
             </a:r>
           </a:p>
           <a:p>
             <a:pPr lvl="2"/>
             <a:r>
-              <a:rPr lang="en-US" smtClean="0"/>
+              <a:rPr lang="en-US"/>
               <a:t>Third level</a:t>
             </a:r>
           </a:p>
           <a:p>
             <a:pPr lvl="3"/>
             <a:r>
-              <a:rPr lang="en-US" smtClean="0"/>
+              <a:rPr lang="en-US"/>
               <a:t>Fourth level</a:t>
             </a:r>
           </a:p>
           <a:p>
             <a:pPr lvl="4"/>
             <a:r>
-              <a:rPr lang="en-US" smtClean="0"/>
+              <a:rPr lang="en-US"/>
               <a:t>Fifth level</a:t>
             </a:r>
-            <a:endParaRPr lang="en-US"/>
           </a:p>
         </p:txBody>
       </p:sp>
@@ -4486,7 +4498,7 @@
           <a:p>
             <a:fld id="{FF632088-7E42-4B13-8645-6CA4616862AF}" type="datetimeFigureOut">
               <a:rPr lang="en-US" smtClean="0"/>
-              <a:t>2/29/2016</a:t>
+              <a:t>3/1/2016</a:t>
             </a:fld>
             <a:endParaRPr lang="en-US"/>
           </a:p>
@@ -4550,7 +4562,7 @@
           <a:lstStyle/>
           <a:p>
             <a:r>
-              <a:rPr lang="en-US" smtClean="0"/>
+              <a:rPr lang="en-US"/>
               <a:t>Click to edit Master title style</a:t>
             </a:r>
             <a:endParaRPr lang="en-US" dirty="0"/>
@@ -4569,7 +4581,7 @@
   </p:clrMapOvr>
   <p:extLst>
     <p:ext uri="{DCECCB84-F9BA-43D5-87BE-67443E8EF086}">
-      <p15:sldGuideLst xmlns:p15="http://schemas.microsoft.com/office/powerpoint/2012/main" xmlns=""/>
+      <p15:sldGuideLst xmlns:p15="http://schemas.microsoft.com/office/powerpoint/2012/main"/>
     </p:ext>
   </p:extLst>
 </p:sldLayout>
@@ -4609,7 +4621,7 @@
           <a:p>
             <a:fld id="{FF632088-7E42-4B13-8645-6CA4616862AF}" type="datetimeFigureOut">
               <a:rPr lang="en-US" smtClean="0"/>
-              <a:t>2/29/2016</a:t>
+              <a:t>3/1/2016</a:t>
             </a:fld>
             <a:endParaRPr lang="en-US"/>
           </a:p>
@@ -4673,10 +4685,9 @@
           <a:lstStyle/>
           <a:p>
             <a:r>
-              <a:rPr lang="en-US" smtClean="0"/>
+              <a:rPr lang="en-US"/>
               <a:t>Click to edit Master title style</a:t>
             </a:r>
-            <a:endParaRPr lang="en-US"/>
           </a:p>
         </p:txBody>
       </p:sp>
@@ -4727,7 +4738,7 @@
           <a:p>
             <a:fld id="{FF632088-7E42-4B13-8645-6CA4616862AF}" type="datetimeFigureOut">
               <a:rPr lang="en-US" smtClean="0"/>
-              <a:t>2/29/2016</a:t>
+              <a:t>3/1/2016</a:t>
             </a:fld>
             <a:endParaRPr lang="en-US"/>
           </a:p>
@@ -4832,7 +4843,7 @@
           </a:lstStyle>
           <a:p>
             <a:r>
-              <a:rPr lang="en-US" smtClean="0"/>
+              <a:rPr lang="en-US"/>
               <a:t>Click to edit Master title style</a:t>
             </a:r>
             <a:endParaRPr lang="en-US" dirty="0"/>
@@ -4889,35 +4900,35 @@
           <a:p>
             <a:pPr lvl="0"/>
             <a:r>
-              <a:rPr lang="en-US" smtClean="0"/>
+              <a:rPr lang="en-US"/>
               <a:t>Edit Master text styles</a:t>
             </a:r>
           </a:p>
           <a:p>
             <a:pPr lvl="1"/>
             <a:r>
-              <a:rPr lang="en-US" smtClean="0"/>
+              <a:rPr lang="en-US"/>
               <a:t>Second level</a:t>
             </a:r>
           </a:p>
           <a:p>
             <a:pPr lvl="2"/>
             <a:r>
-              <a:rPr lang="en-US" smtClean="0"/>
+              <a:rPr lang="en-US"/>
               <a:t>Third level</a:t>
             </a:r>
           </a:p>
           <a:p>
             <a:pPr lvl="3"/>
             <a:r>
-              <a:rPr lang="en-US" smtClean="0"/>
+              <a:rPr lang="en-US"/>
               <a:t>Fourth level</a:t>
             </a:r>
           </a:p>
           <a:p>
             <a:pPr lvl="4"/>
             <a:r>
-              <a:rPr lang="en-US" smtClean="0"/>
+              <a:rPr lang="en-US"/>
               <a:t>Fifth level</a:t>
             </a:r>
             <a:endParaRPr lang="en-US" dirty="0"/>
@@ -4988,7 +4999,7 @@
           <a:p>
             <a:pPr lvl="0"/>
             <a:r>
-              <a:rPr lang="en-US" smtClean="0"/>
+              <a:rPr lang="en-US"/>
               <a:t>Edit Master text styles</a:t>
             </a:r>
           </a:p>
@@ -5011,7 +5022,7 @@
           <a:p>
             <a:fld id="{FF632088-7E42-4B13-8645-6CA4616862AF}" type="datetimeFigureOut">
               <a:rPr lang="en-US" smtClean="0"/>
-              <a:t>2/29/2016</a:t>
+              <a:t>3/1/2016</a:t>
             </a:fld>
             <a:endParaRPr lang="en-US"/>
           </a:p>
@@ -5071,7 +5082,7 @@
   </p:clrMapOvr>
   <p:extLst>
     <p:ext uri="{DCECCB84-F9BA-43D5-87BE-67443E8EF086}">
-      <p15:sldGuideLst xmlns:p15="http://schemas.microsoft.com/office/powerpoint/2012/main" xmlns=""/>
+      <p15:sldGuideLst xmlns:p15="http://schemas.microsoft.com/office/powerpoint/2012/main"/>
     </p:ext>
   </p:extLst>
 </p:sldLayout>
@@ -5121,7 +5132,7 @@
           </a:lstStyle>
           <a:p>
             <a:r>
-              <a:rPr lang="en-US" smtClean="0"/>
+              <a:rPr lang="en-US"/>
               <a:t>Click to edit Master title style</a:t>
             </a:r>
             <a:endParaRPr lang="en-US" dirty="0"/>
@@ -5186,7 +5197,7 @@
           </a:lstStyle>
           <a:p>
             <a:r>
-              <a:rPr lang="en-US" smtClean="0"/>
+              <a:rPr lang="en-US"/>
               <a:t>Click icon to add picture</a:t>
             </a:r>
             <a:endParaRPr lang="en-US" dirty="0"/>
@@ -5257,7 +5268,7 @@
           <a:p>
             <a:pPr lvl="0"/>
             <a:r>
-              <a:rPr lang="en-US" smtClean="0"/>
+              <a:rPr lang="en-US"/>
               <a:t>Edit Master text styles</a:t>
             </a:r>
           </a:p>
@@ -5280,7 +5291,7 @@
           <a:p>
             <a:fld id="{FF632088-7E42-4B13-8645-6CA4616862AF}" type="datetimeFigureOut">
               <a:rPr lang="en-US" smtClean="0"/>
-              <a:t>2/29/2016</a:t>
+              <a:t>3/1/2016</a:t>
             </a:fld>
             <a:endParaRPr lang="en-US"/>
           </a:p>
@@ -5389,7 +5400,7 @@
           <a:lstStyle/>
           <a:p>
             <a:r>
-              <a:rPr lang="en-US" smtClean="0"/>
+              <a:rPr lang="en-US"/>
               <a:t>Click to edit Master title style</a:t>
             </a:r>
             <a:endParaRPr lang="en-US" dirty="0"/>
@@ -5423,35 +5434,35 @@
           <a:p>
             <a:pPr lvl="0"/>
             <a:r>
-              <a:rPr lang="en-US" smtClean="0"/>
+              <a:rPr lang="en-US"/>
               <a:t>Edit Master text styles</a:t>
             </a:r>
           </a:p>
           <a:p>
             <a:pPr lvl="1"/>
             <a:r>
-              <a:rPr lang="en-US" smtClean="0"/>
+              <a:rPr lang="en-US"/>
               <a:t>Second level</a:t>
             </a:r>
           </a:p>
           <a:p>
             <a:pPr lvl="2"/>
             <a:r>
-              <a:rPr lang="en-US" smtClean="0"/>
+              <a:rPr lang="en-US"/>
               <a:t>Third level</a:t>
             </a:r>
           </a:p>
           <a:p>
             <a:pPr lvl="3"/>
             <a:r>
-              <a:rPr lang="en-US" smtClean="0"/>
+              <a:rPr lang="en-US"/>
               <a:t>Fourth level</a:t>
             </a:r>
           </a:p>
           <a:p>
             <a:pPr lvl="4"/>
             <a:r>
-              <a:rPr lang="en-US" smtClean="0"/>
+              <a:rPr lang="en-US"/>
               <a:t>Fifth level</a:t>
             </a:r>
             <a:endParaRPr lang="en-US" dirty="0"/>
@@ -5494,7 +5505,7 @@
           <a:p>
             <a:fld id="{FF632088-7E42-4B13-8645-6CA4616862AF}" type="datetimeFigureOut">
               <a:rPr lang="en-US" smtClean="0"/>
-              <a:t>2/29/2016</a:t>
+              <a:t>3/1/2016</a:t>
             </a:fld>
             <a:endParaRPr lang="en-US"/>
           </a:p>
@@ -5870,7 +5881,7 @@
   </p:txStyles>
   <p:extLst>
     <p:ext uri="{27BBF7A9-308A-43DC-89C8-2F10F3537804}">
-      <p15:sldGuideLst xmlns:p15="http://schemas.microsoft.com/office/powerpoint/2012/main" xmlns=""/>
+      <p15:sldGuideLst xmlns:p15="http://schemas.microsoft.com/office/powerpoint/2012/main"/>
     </p:ext>
   </p:extLst>
 </p:sldMaster>
@@ -5996,7 +6007,7 @@
           <a:lstStyle/>
           <a:p>
             <a:r>
-              <a:rPr lang="en-US" smtClean="0"/>
+              <a:rPr lang="en-US"/>
               <a:t>Click to edit Master title style</a:t>
             </a:r>
             <a:endParaRPr lang="en-US" dirty="0"/>
@@ -6099,7 +6110,7 @@
           <a:p>
             <a:fld id="{FF632088-7E42-4B13-8645-6CA4616862AF}" type="datetimeFigureOut">
               <a:rPr lang="en-US" smtClean="0"/>
-              <a:t>2/29/2016</a:t>
+              <a:t>3/1/2016</a:t>
             </a:fld>
             <a:endParaRPr lang="en-US"/>
           </a:p>
@@ -6567,7 +6578,7 @@
   </p:txStyles>
   <p:extLst>
     <p:ext uri="{27BBF7A9-308A-43DC-89C8-2F10F3537804}">
-      <p15:sldGuideLst xmlns:p15="http://schemas.microsoft.com/office/powerpoint/2012/main" xmlns=""/>
+      <p15:sldGuideLst xmlns:p15="http://schemas.microsoft.com/office/powerpoint/2012/main"/>
     </p:ext>
   </p:extLst>
 </p:sldMaster>
@@ -6606,10 +6617,9 @@
           <a:lstStyle/>
           <a:p>
             <a:r>
-              <a:rPr lang="en-US" dirty="0" smtClean="0"/>
+              <a:rPr lang="en-US" dirty="0"/>
               <a:t>Member Eligibility Data</a:t>
             </a:r>
-            <a:endParaRPr lang="en-US" dirty="0"/>
           </a:p>
         </p:txBody>
       </p:sp>
@@ -6629,13 +6639,45 @@
           <a:lstStyle/>
           <a:p>
             <a:r>
-              <a:rPr lang="en-US" smtClean="0"/>
+              <a:rPr lang="en-US"/>
               <a:t>Spyridon Ganas</a:t>
             </a:r>
-            <a:endParaRPr lang="en-US"/>
-          </a:p>
-        </p:txBody>
-      </p:sp>
+          </a:p>
+        </p:txBody>
+      </p:sp>
+      <p:pic>
+        <p:nvPicPr>
+          <p:cNvPr id="4" name="Audio 3">
+            <a:hlinkClick r:id="" action="ppaction://media"/>
+          </p:cNvPr>
+          <p:cNvPicPr>
+            <a:picLocks noChangeAspect="1"/>
+          </p:cNvPicPr>
+          <p:nvPr>
+            <a:audioFile r:link="rId2"/>
+            <p:extLst>
+              <p:ext uri="{DAA4B4D4-6D71-4841-9C94-3DE7FCFB9230}">
+                <p14:media xmlns:p14="http://schemas.microsoft.com/office/powerpoint/2010/main" r:embed="rId1"/>
+              </p:ext>
+            </p:extLst>
+          </p:nvPr>
+        </p:nvPicPr>
+        <p:blipFill>
+          <a:blip r:embed="rId4"/>
+          <a:stretch>
+            <a:fillRect/>
+          </a:stretch>
+        </p:blipFill>
+        <p:spPr>
+          <a:xfrm>
+            <a:off x="12625754" y="6002215"/>
+            <a:ext cx="609600" cy="609600"/>
+          </a:xfrm>
+          <a:prstGeom prst="rect">
+            <a:avLst/>
+          </a:prstGeom>
+        </p:spPr>
+      </p:pic>
     </p:spTree>
     <p:extLst>
       <p:ext uri="{BB962C8B-B14F-4D97-AF65-F5344CB8AC3E}">
@@ -6646,6 +6688,101 @@
   <p:clrMapOvr>
     <a:masterClrMapping/>
   </p:clrMapOvr>
+  <mc:AlternateContent xmlns:mc="http://schemas.openxmlformats.org/markup-compatibility/2006" xmlns:p14="http://schemas.microsoft.com/office/powerpoint/2010/main">
+    <mc:Choice Requires="p14">
+      <p:transition spd="slow" p14:dur="2000" advTm="8037"/>
+    </mc:Choice>
+    <mc:Fallback xmlns="">
+      <p:transition spd="slow" advTm="8037"/>
+    </mc:Fallback>
+  </mc:AlternateContent>
+  <p:timing>
+    <p:tnLst>
+      <p:par>
+        <p:cTn id="1" dur="indefinite" restart="never" nodeType="tmRoot">
+          <p:childTnLst>
+            <p:seq concurrent="1" nextAc="seek">
+              <p:cTn id="2" dur="indefinite" nodeType="mainSeq">
+                <p:childTnLst>
+                  <p:par>
+                    <p:cTn id="3" fill="hold">
+                      <p:stCondLst>
+                        <p:cond delay="indefinite"/>
+                        <p:cond evt="onBegin" delay="0">
+                          <p:tn val="2"/>
+                        </p:cond>
+                      </p:stCondLst>
+                      <p:childTnLst>
+                        <p:par>
+                          <p:cTn id="4" fill="hold">
+                            <p:stCondLst>
+                              <p:cond delay="0"/>
+                            </p:stCondLst>
+                            <p:childTnLst>
+                              <p:par>
+                                <p:cTn id="5" presetID="1" presetClass="mediacall" presetSubtype="0" fill="hold" nodeType="afterEffect">
+                                  <p:stCondLst>
+                                    <p:cond delay="0"/>
+                                  </p:stCondLst>
+                                  <p:childTnLst>
+                                    <p:cmd type="call" cmd="playFrom(0.0)">
+                                      <p:cBhvr>
+                                        <p:cTn id="6" dur="1" fill="hold"/>
+                                        <p:tgtEl>
+                                          <p:spTgt spid="4"/>
+                                        </p:tgtEl>
+                                      </p:cBhvr>
+                                    </p:cmd>
+                                  </p:childTnLst>
+                                </p:cTn>
+                              </p:par>
+                            </p:childTnLst>
+                          </p:cTn>
+                        </p:par>
+                      </p:childTnLst>
+                    </p:cTn>
+                  </p:par>
+                </p:childTnLst>
+              </p:cTn>
+              <p:prevCondLst>
+                <p:cond evt="onPrev" delay="0">
+                  <p:tgtEl>
+                    <p:sldTgt/>
+                  </p:tgtEl>
+                </p:cond>
+              </p:prevCondLst>
+              <p:nextCondLst>
+                <p:cond evt="onNext" delay="0">
+                  <p:tgtEl>
+                    <p:sldTgt/>
+                  </p:tgtEl>
+                </p:cond>
+              </p:nextCondLst>
+            </p:seq>
+            <p:audio isNarration="1">
+              <p:cMediaNode vol="80000" showWhenStopped="0">
+                <p:cTn id="7" fill="hold" display="0">
+                  <p:stCondLst>
+                    <p:cond delay="indefinite"/>
+                  </p:stCondLst>
+                  <p:endCondLst>
+                    <p:cond evt="onStopAudio" delay="0">
+                      <p:tgtEl>
+                        <p:sldTgt/>
+                      </p:tgtEl>
+                    </p:cond>
+                  </p:endCondLst>
+                </p:cTn>
+                <p:tgtEl>
+                  <p:spTgt spid="4"/>
+                </p:tgtEl>
+              </p:cMediaNode>
+            </p:audio>
+          </p:childTnLst>
+        </p:cTn>
+      </p:par>
+    </p:tnLst>
+  </p:timing>
 </p:sld>
 </file>
 
@@ -6682,10 +6819,9 @@
           <a:lstStyle/>
           <a:p>
             <a:r>
-              <a:rPr lang="en-US" dirty="0" smtClean="0"/>
+              <a:rPr lang="en-US" dirty="0"/>
               <a:t>Health Insurance Member Eligibility Records</a:t>
             </a:r>
-            <a:endParaRPr lang="en-US" dirty="0"/>
           </a:p>
         </p:txBody>
       </p:sp>
@@ -6701,50 +6837,83 @@
         </p:nvSpPr>
         <p:spPr/>
         <p:txBody>
-          <a:bodyPr/>
-          <a:lstStyle/>
-          <a:p>
-            <a:r>
-              <a:rPr lang="en-US" dirty="0" smtClean="0"/>
+          <a:bodyPr>
+            <a:normAutofit lnSpcReduction="10000"/>
+          </a:bodyPr>
+          <a:lstStyle/>
+          <a:p>
+            <a:r>
+              <a:rPr lang="en-US" dirty="0"/>
               <a:t>Each eligibility record contains data for a single member.</a:t>
             </a:r>
           </a:p>
           <a:p>
             <a:r>
-              <a:rPr lang="en-US" dirty="0" smtClean="0"/>
+              <a:rPr lang="en-US" dirty="0"/>
               <a:t>The eligibility record is linked to a product, which describes the health insurance policy that member was enroll in.</a:t>
             </a:r>
           </a:p>
           <a:p>
             <a:r>
-              <a:rPr lang="en-US" dirty="0" smtClean="0"/>
+              <a:rPr lang="en-US" dirty="0"/>
               <a:t>If the member has a primary care physician (PCP), that PCP is also recorded in the eligibility record.</a:t>
             </a:r>
           </a:p>
           <a:p>
             <a:r>
-              <a:rPr lang="en-US" dirty="0" smtClean="0"/>
+              <a:rPr lang="en-US" dirty="0"/>
               <a:t>The eligibility record includes a start date and end date.  </a:t>
             </a:r>
-            <a:endParaRPr lang="en-US" dirty="0"/>
           </a:p>
           <a:p>
             <a:pPr lvl="1"/>
             <a:r>
-              <a:rPr lang="en-US" dirty="0" smtClean="0"/>
+              <a:rPr lang="en-US" dirty="0"/>
               <a:t>These dates show when the member had that PCP and insurance policy.</a:t>
             </a:r>
           </a:p>
           <a:p>
             <a:pPr lvl="1"/>
             <a:r>
-              <a:rPr lang="en-US" dirty="0" smtClean="0"/>
+              <a:rPr lang="en-US" dirty="0"/>
               <a:t>If the policy is still active, the end date may be a date in the future or null.</a:t>
             </a:r>
-            <a:endParaRPr lang="en-US" dirty="0"/>
-          </a:p>
-        </p:txBody>
-      </p:sp>
+          </a:p>
+        </p:txBody>
+      </p:sp>
+      <p:pic>
+        <p:nvPicPr>
+          <p:cNvPr id="4" name="Audio 3">
+            <a:hlinkClick r:id="" action="ppaction://media"/>
+          </p:cNvPr>
+          <p:cNvPicPr>
+            <a:picLocks noChangeAspect="1"/>
+          </p:cNvPicPr>
+          <p:nvPr>
+            <a:audioFile r:link="rId2"/>
+            <p:extLst>
+              <p:ext uri="{DAA4B4D4-6D71-4841-9C94-3DE7FCFB9230}">
+                <p14:media xmlns:p14="http://schemas.microsoft.com/office/powerpoint/2010/main" r:embed="rId1"/>
+              </p:ext>
+            </p:extLst>
+          </p:nvPr>
+        </p:nvPicPr>
+        <p:blipFill>
+          <a:blip r:embed="rId4"/>
+          <a:stretch>
+            <a:fillRect/>
+          </a:stretch>
+        </p:blipFill>
+        <p:spPr>
+          <a:xfrm>
+            <a:off x="12344400" y="6072554"/>
+            <a:ext cx="609600" cy="609600"/>
+          </a:xfrm>
+          <a:prstGeom prst="rect">
+            <a:avLst/>
+          </a:prstGeom>
+        </p:spPr>
+      </p:pic>
     </p:spTree>
     <p:extLst>
       <p:ext uri="{BB962C8B-B14F-4D97-AF65-F5344CB8AC3E}">
@@ -6755,6 +6924,101 @@
   <p:clrMapOvr>
     <a:masterClrMapping/>
   </p:clrMapOvr>
+  <mc:AlternateContent xmlns:mc="http://schemas.openxmlformats.org/markup-compatibility/2006" xmlns:p14="http://schemas.microsoft.com/office/powerpoint/2010/main">
+    <mc:Choice Requires="p14">
+      <p:transition spd="slow" p14:dur="2000" advTm="40689"/>
+    </mc:Choice>
+    <mc:Fallback xmlns="">
+      <p:transition spd="slow" advTm="40689"/>
+    </mc:Fallback>
+  </mc:AlternateContent>
+  <p:timing>
+    <p:tnLst>
+      <p:par>
+        <p:cTn id="1" dur="indefinite" restart="never" nodeType="tmRoot">
+          <p:childTnLst>
+            <p:seq concurrent="1" nextAc="seek">
+              <p:cTn id="2" dur="indefinite" nodeType="mainSeq">
+                <p:childTnLst>
+                  <p:par>
+                    <p:cTn id="3" fill="hold">
+                      <p:stCondLst>
+                        <p:cond delay="indefinite"/>
+                        <p:cond evt="onBegin" delay="0">
+                          <p:tn val="2"/>
+                        </p:cond>
+                      </p:stCondLst>
+                      <p:childTnLst>
+                        <p:par>
+                          <p:cTn id="4" fill="hold">
+                            <p:stCondLst>
+                              <p:cond delay="0"/>
+                            </p:stCondLst>
+                            <p:childTnLst>
+                              <p:par>
+                                <p:cTn id="5" presetID="1" presetClass="mediacall" presetSubtype="0" fill="hold" nodeType="afterEffect">
+                                  <p:stCondLst>
+                                    <p:cond delay="0"/>
+                                  </p:stCondLst>
+                                  <p:childTnLst>
+                                    <p:cmd type="call" cmd="playFrom(0.0)">
+                                      <p:cBhvr>
+                                        <p:cTn id="6" dur="1" fill="hold"/>
+                                        <p:tgtEl>
+                                          <p:spTgt spid="4"/>
+                                        </p:tgtEl>
+                                      </p:cBhvr>
+                                    </p:cmd>
+                                  </p:childTnLst>
+                                </p:cTn>
+                              </p:par>
+                            </p:childTnLst>
+                          </p:cTn>
+                        </p:par>
+                      </p:childTnLst>
+                    </p:cTn>
+                  </p:par>
+                </p:childTnLst>
+              </p:cTn>
+              <p:prevCondLst>
+                <p:cond evt="onPrev" delay="0">
+                  <p:tgtEl>
+                    <p:sldTgt/>
+                  </p:tgtEl>
+                </p:cond>
+              </p:prevCondLst>
+              <p:nextCondLst>
+                <p:cond evt="onNext" delay="0">
+                  <p:tgtEl>
+                    <p:sldTgt/>
+                  </p:tgtEl>
+                </p:cond>
+              </p:nextCondLst>
+            </p:seq>
+            <p:audio isNarration="1">
+              <p:cMediaNode vol="80000" showWhenStopped="0">
+                <p:cTn id="7" fill="hold" display="0">
+                  <p:stCondLst>
+                    <p:cond delay="indefinite"/>
+                  </p:stCondLst>
+                  <p:endCondLst>
+                    <p:cond evt="onStopAudio" delay="0">
+                      <p:tgtEl>
+                        <p:sldTgt/>
+                      </p:tgtEl>
+                    </p:cond>
+                  </p:endCondLst>
+                </p:cTn>
+                <p:tgtEl>
+                  <p:spTgt spid="4"/>
+                </p:tgtEl>
+              </p:cMediaNode>
+            </p:audio>
+          </p:childTnLst>
+        </p:cTn>
+      </p:par>
+    </p:tnLst>
+  </p:timing>
 </p:sld>
 </file>
 
@@ -6791,10 +7055,9 @@
           <a:lstStyle/>
           <a:p>
             <a:r>
-              <a:rPr lang="en-US" dirty="0" smtClean="0"/>
+              <a:rPr lang="en-US" dirty="0"/>
               <a:t>Member &amp; Subscriber Details</a:t>
             </a:r>
-            <a:endParaRPr lang="en-US" dirty="0"/>
           </a:p>
         </p:txBody>
       </p:sp>
@@ -6821,62 +7084,94 @@
           <a:lstStyle/>
           <a:p>
             <a:r>
-              <a:rPr lang="en-US" dirty="0" smtClean="0"/>
+              <a:rPr lang="en-US" dirty="0"/>
               <a:t>The eligibility data contains detailed identification and demographic data for both the member and that member’s subscriber :</a:t>
             </a:r>
           </a:p>
           <a:p>
             <a:pPr lvl="1"/>
             <a:r>
-              <a:rPr lang="en-US" dirty="0" smtClean="0"/>
+              <a:rPr lang="en-US" dirty="0"/>
               <a:t>Names</a:t>
             </a:r>
           </a:p>
           <a:p>
             <a:pPr lvl="1"/>
             <a:r>
-              <a:rPr lang="en-US" dirty="0" smtClean="0"/>
+              <a:rPr lang="en-US" dirty="0"/>
               <a:t>Addresses</a:t>
             </a:r>
           </a:p>
           <a:p>
             <a:pPr lvl="1"/>
             <a:r>
-              <a:rPr lang="en-US" dirty="0" smtClean="0"/>
+              <a:rPr lang="en-US" dirty="0"/>
               <a:t>Social Security numbers</a:t>
             </a:r>
           </a:p>
           <a:p>
             <a:pPr lvl="1"/>
             <a:r>
-              <a:rPr lang="en-US" dirty="0" smtClean="0"/>
+              <a:rPr lang="en-US" dirty="0"/>
               <a:t>Birthday</a:t>
             </a:r>
           </a:p>
           <a:p>
             <a:pPr lvl="1"/>
             <a:r>
-              <a:rPr lang="en-US" dirty="0" smtClean="0"/>
+              <a:rPr lang="en-US" dirty="0"/>
               <a:t>Relationship to Subscriber</a:t>
             </a:r>
           </a:p>
           <a:p>
             <a:pPr lvl="1"/>
             <a:r>
-              <a:rPr lang="en-US" dirty="0" smtClean="0"/>
+              <a:rPr lang="en-US" dirty="0"/>
               <a:t>Race</a:t>
             </a:r>
           </a:p>
           <a:p>
             <a:pPr lvl="1"/>
             <a:r>
-              <a:rPr lang="en-US" dirty="0" smtClean="0"/>
+              <a:rPr lang="en-US" dirty="0"/>
               <a:t>Primary Language</a:t>
             </a:r>
-            <a:endParaRPr lang="en-US" dirty="0"/>
-          </a:p>
-        </p:txBody>
-      </p:sp>
+          </a:p>
+        </p:txBody>
+      </p:sp>
+      <p:pic>
+        <p:nvPicPr>
+          <p:cNvPr id="4" name="Audio 3">
+            <a:hlinkClick r:id="" action="ppaction://media"/>
+          </p:cNvPr>
+          <p:cNvPicPr>
+            <a:picLocks noChangeAspect="1"/>
+          </p:cNvPicPr>
+          <p:nvPr>
+            <a:audioFile r:link="rId2"/>
+            <p:extLst>
+              <p:ext uri="{DAA4B4D4-6D71-4841-9C94-3DE7FCFB9230}">
+                <p14:media xmlns:p14="http://schemas.microsoft.com/office/powerpoint/2010/main" r:embed="rId1"/>
+              </p:ext>
+            </p:extLst>
+          </p:nvPr>
+        </p:nvPicPr>
+        <p:blipFill>
+          <a:blip r:embed="rId4"/>
+          <a:stretch>
+            <a:fillRect/>
+          </a:stretch>
+        </p:blipFill>
+        <p:spPr>
+          <a:xfrm>
+            <a:off x="12485077" y="6084276"/>
+            <a:ext cx="609600" cy="609600"/>
+          </a:xfrm>
+          <a:prstGeom prst="rect">
+            <a:avLst/>
+          </a:prstGeom>
+        </p:spPr>
+      </p:pic>
     </p:spTree>
     <p:extLst>
       <p:ext uri="{BB962C8B-B14F-4D97-AF65-F5344CB8AC3E}">
@@ -6887,6 +7182,101 @@
   <p:clrMapOvr>
     <a:masterClrMapping/>
   </p:clrMapOvr>
+  <mc:AlternateContent xmlns:mc="http://schemas.openxmlformats.org/markup-compatibility/2006" xmlns:p14="http://schemas.microsoft.com/office/powerpoint/2010/main">
+    <mc:Choice Requires="p14">
+      <p:transition spd="slow" p14:dur="2000" advTm="16455"/>
+    </mc:Choice>
+    <mc:Fallback xmlns="">
+      <p:transition spd="slow" advTm="16455"/>
+    </mc:Fallback>
+  </mc:AlternateContent>
+  <p:timing>
+    <p:tnLst>
+      <p:par>
+        <p:cTn id="1" dur="indefinite" restart="never" nodeType="tmRoot">
+          <p:childTnLst>
+            <p:seq concurrent="1" nextAc="seek">
+              <p:cTn id="2" dur="indefinite" nodeType="mainSeq">
+                <p:childTnLst>
+                  <p:par>
+                    <p:cTn id="3" fill="hold">
+                      <p:stCondLst>
+                        <p:cond delay="indefinite"/>
+                        <p:cond evt="onBegin" delay="0">
+                          <p:tn val="2"/>
+                        </p:cond>
+                      </p:stCondLst>
+                      <p:childTnLst>
+                        <p:par>
+                          <p:cTn id="4" fill="hold">
+                            <p:stCondLst>
+                              <p:cond delay="0"/>
+                            </p:stCondLst>
+                            <p:childTnLst>
+                              <p:par>
+                                <p:cTn id="5" presetID="1" presetClass="mediacall" presetSubtype="0" fill="hold" nodeType="afterEffect">
+                                  <p:stCondLst>
+                                    <p:cond delay="0"/>
+                                  </p:stCondLst>
+                                  <p:childTnLst>
+                                    <p:cmd type="call" cmd="playFrom(0.0)">
+                                      <p:cBhvr>
+                                        <p:cTn id="6" dur="1" fill="hold"/>
+                                        <p:tgtEl>
+                                          <p:spTgt spid="4"/>
+                                        </p:tgtEl>
+                                      </p:cBhvr>
+                                    </p:cmd>
+                                  </p:childTnLst>
+                                </p:cTn>
+                              </p:par>
+                            </p:childTnLst>
+                          </p:cTn>
+                        </p:par>
+                      </p:childTnLst>
+                    </p:cTn>
+                  </p:par>
+                </p:childTnLst>
+              </p:cTn>
+              <p:prevCondLst>
+                <p:cond evt="onPrev" delay="0">
+                  <p:tgtEl>
+                    <p:sldTgt/>
+                  </p:tgtEl>
+                </p:cond>
+              </p:prevCondLst>
+              <p:nextCondLst>
+                <p:cond evt="onNext" delay="0">
+                  <p:tgtEl>
+                    <p:sldTgt/>
+                  </p:tgtEl>
+                </p:cond>
+              </p:nextCondLst>
+            </p:seq>
+            <p:audio isNarration="1">
+              <p:cMediaNode vol="80000" showWhenStopped="0">
+                <p:cTn id="7" fill="hold" display="0">
+                  <p:stCondLst>
+                    <p:cond delay="indefinite"/>
+                  </p:stCondLst>
+                  <p:endCondLst>
+                    <p:cond evt="onStopAudio" delay="0">
+                      <p:tgtEl>
+                        <p:sldTgt/>
+                      </p:tgtEl>
+                    </p:cond>
+                  </p:endCondLst>
+                </p:cTn>
+                <p:tgtEl>
+                  <p:spTgt spid="4"/>
+                </p:tgtEl>
+              </p:cMediaNode>
+            </p:audio>
+          </p:childTnLst>
+        </p:cTn>
+      </p:par>
+    </p:tnLst>
+  </p:timing>
 </p:sld>
 </file>
 
@@ -6923,10 +7313,9 @@
           <a:lstStyle/>
           <a:p>
             <a:r>
-              <a:rPr lang="en-US" dirty="0" smtClean="0"/>
+              <a:rPr lang="en-US" dirty="0"/>
               <a:t>Insurance Policy Information</a:t>
             </a:r>
-            <a:endParaRPr lang="en-US" dirty="0"/>
           </a:p>
         </p:txBody>
       </p:sp>
@@ -6946,62 +7335,94 @@
           <a:lstStyle/>
           <a:p>
             <a:r>
-              <a:rPr lang="en-US" dirty="0" smtClean="0"/>
+              <a:rPr lang="en-US" dirty="0"/>
               <a:t>The eligibility data contains information about the members insurance policy:</a:t>
             </a:r>
           </a:p>
           <a:p>
             <a:pPr lvl="1"/>
             <a:r>
-              <a:rPr lang="en-US" dirty="0" smtClean="0"/>
+              <a:rPr lang="en-US" dirty="0"/>
               <a:t>Insurance Contract Number</a:t>
             </a:r>
           </a:p>
           <a:p>
             <a:pPr lvl="1"/>
             <a:r>
-              <a:rPr lang="en-US" dirty="0" smtClean="0"/>
+              <a:rPr lang="en-US" dirty="0"/>
               <a:t>Type of insurance contract (individual, employee and family, dependent only, etc.)</a:t>
             </a:r>
           </a:p>
           <a:p>
             <a:pPr lvl="1"/>
             <a:r>
-              <a:rPr lang="en-US" dirty="0" smtClean="0"/>
+              <a:rPr lang="en-US" dirty="0"/>
               <a:t>Medical Coverage Indicator</a:t>
             </a:r>
           </a:p>
           <a:p>
             <a:pPr lvl="1"/>
             <a:r>
-              <a:rPr lang="en-US" dirty="0" smtClean="0"/>
+              <a:rPr lang="en-US" dirty="0"/>
               <a:t>Pharmacy Coverage Indicator</a:t>
             </a:r>
           </a:p>
           <a:p>
             <a:pPr lvl="1"/>
             <a:r>
-              <a:rPr lang="en-US" dirty="0" smtClean="0"/>
+              <a:rPr lang="en-US" dirty="0"/>
               <a:t>Behavioral Health Coverage Indicator</a:t>
             </a:r>
           </a:p>
           <a:p>
             <a:pPr lvl="1"/>
             <a:r>
-              <a:rPr lang="en-US" dirty="0" smtClean="0"/>
+              <a:rPr lang="en-US" dirty="0"/>
               <a:t>Monthly Premium</a:t>
             </a:r>
           </a:p>
           <a:p>
             <a:pPr lvl="1"/>
             <a:r>
-              <a:rPr lang="en-US" dirty="0" smtClean="0"/>
+              <a:rPr lang="en-US" dirty="0"/>
               <a:t>Actuarial Value of the policy’s benefits.</a:t>
             </a:r>
-            <a:endParaRPr lang="en-US" dirty="0"/>
-          </a:p>
-        </p:txBody>
-      </p:sp>
+          </a:p>
+        </p:txBody>
+      </p:sp>
+      <p:pic>
+        <p:nvPicPr>
+          <p:cNvPr id="4" name="Audio 3">
+            <a:hlinkClick r:id="" action="ppaction://media"/>
+          </p:cNvPr>
+          <p:cNvPicPr>
+            <a:picLocks noChangeAspect="1"/>
+          </p:cNvPicPr>
+          <p:nvPr>
+            <a:audioFile r:link="rId2"/>
+            <p:extLst>
+              <p:ext uri="{DAA4B4D4-6D71-4841-9C94-3DE7FCFB9230}">
+                <p14:media xmlns:p14="http://schemas.microsoft.com/office/powerpoint/2010/main" r:embed="rId1"/>
+              </p:ext>
+            </p:extLst>
+          </p:nvPr>
+        </p:nvPicPr>
+        <p:blipFill>
+          <a:blip r:embed="rId4"/>
+          <a:stretch>
+            <a:fillRect/>
+          </a:stretch>
+        </p:blipFill>
+        <p:spPr>
+          <a:xfrm>
+            <a:off x="12918831" y="6189785"/>
+            <a:ext cx="609600" cy="609600"/>
+          </a:xfrm>
+          <a:prstGeom prst="rect">
+            <a:avLst/>
+          </a:prstGeom>
+        </p:spPr>
+      </p:pic>
     </p:spTree>
     <p:extLst>
       <p:ext uri="{BB962C8B-B14F-4D97-AF65-F5344CB8AC3E}">
@@ -7012,6 +7433,101 @@
   <p:clrMapOvr>
     <a:masterClrMapping/>
   </p:clrMapOvr>
+  <mc:AlternateContent xmlns:mc="http://schemas.openxmlformats.org/markup-compatibility/2006" xmlns:p14="http://schemas.microsoft.com/office/powerpoint/2010/main">
+    <mc:Choice Requires="p14">
+      <p:transition spd="slow" p14:dur="2000" advTm="27248"/>
+    </mc:Choice>
+    <mc:Fallback xmlns="">
+      <p:transition spd="slow" advTm="27248"/>
+    </mc:Fallback>
+  </mc:AlternateContent>
+  <p:timing>
+    <p:tnLst>
+      <p:par>
+        <p:cTn id="1" dur="indefinite" restart="never" nodeType="tmRoot">
+          <p:childTnLst>
+            <p:seq concurrent="1" nextAc="seek">
+              <p:cTn id="2" dur="indefinite" nodeType="mainSeq">
+                <p:childTnLst>
+                  <p:par>
+                    <p:cTn id="3" fill="hold">
+                      <p:stCondLst>
+                        <p:cond delay="indefinite"/>
+                        <p:cond evt="onBegin" delay="0">
+                          <p:tn val="2"/>
+                        </p:cond>
+                      </p:stCondLst>
+                      <p:childTnLst>
+                        <p:par>
+                          <p:cTn id="4" fill="hold">
+                            <p:stCondLst>
+                              <p:cond delay="0"/>
+                            </p:stCondLst>
+                            <p:childTnLst>
+                              <p:par>
+                                <p:cTn id="5" presetID="1" presetClass="mediacall" presetSubtype="0" fill="hold" nodeType="afterEffect">
+                                  <p:stCondLst>
+                                    <p:cond delay="0"/>
+                                  </p:stCondLst>
+                                  <p:childTnLst>
+                                    <p:cmd type="call" cmd="playFrom(0.0)">
+                                      <p:cBhvr>
+                                        <p:cTn id="6" dur="1" fill="hold"/>
+                                        <p:tgtEl>
+                                          <p:spTgt spid="4"/>
+                                        </p:tgtEl>
+                                      </p:cBhvr>
+                                    </p:cmd>
+                                  </p:childTnLst>
+                                </p:cTn>
+                              </p:par>
+                            </p:childTnLst>
+                          </p:cTn>
+                        </p:par>
+                      </p:childTnLst>
+                    </p:cTn>
+                  </p:par>
+                </p:childTnLst>
+              </p:cTn>
+              <p:prevCondLst>
+                <p:cond evt="onPrev" delay="0">
+                  <p:tgtEl>
+                    <p:sldTgt/>
+                  </p:tgtEl>
+                </p:cond>
+              </p:prevCondLst>
+              <p:nextCondLst>
+                <p:cond evt="onNext" delay="0">
+                  <p:tgtEl>
+                    <p:sldTgt/>
+                  </p:tgtEl>
+                </p:cond>
+              </p:nextCondLst>
+            </p:seq>
+            <p:audio isNarration="1">
+              <p:cMediaNode vol="80000" showWhenStopped="0">
+                <p:cTn id="7" fill="hold" display="0">
+                  <p:stCondLst>
+                    <p:cond delay="indefinite"/>
+                  </p:stCondLst>
+                  <p:endCondLst>
+                    <p:cond evt="onStopAudio" delay="0">
+                      <p:tgtEl>
+                        <p:sldTgt/>
+                      </p:tgtEl>
+                    </p:cond>
+                  </p:endCondLst>
+                </p:cTn>
+                <p:tgtEl>
+                  <p:spTgt spid="4"/>
+                </p:tgtEl>
+              </p:cMediaNode>
+            </p:audio>
+          </p:childTnLst>
+        </p:cTn>
+      </p:par>
+    </p:tnLst>
+  </p:timing>
 </p:sld>
 </file>
 
@@ -7048,18 +7564,9 @@
           <a:lstStyle/>
           <a:p>
             <a:r>
-              <a:rPr lang="en-US" dirty="0" smtClean="0"/>
-              <a:t>Using Member Eligibility Data to </a:t>
-            </a:r>
-            <a:r>
               <a:rPr lang="en-US" dirty="0"/>
-              <a:t>L</a:t>
-            </a:r>
-            <a:r>
-              <a:rPr lang="en-US" dirty="0" smtClean="0"/>
-              <a:t>ink APCD Data</a:t>
-            </a:r>
-            <a:endParaRPr lang="en-US" dirty="0"/>
+              <a:t>Using Member Eligibility Data to Link APCD Data</a:t>
+            </a:r>
           </a:p>
         </p:txBody>
       </p:sp>
@@ -7086,15 +7593,15 @@
           <a:lstStyle/>
           <a:p>
             <a:r>
-              <a:rPr lang="en-US" dirty="0" smtClean="0"/>
+              <a:rPr lang="en-US" dirty="0"/>
               <a:t>A member must be enrolled in a health insurance product </a:t>
             </a:r>
             <a:r>
-              <a:rPr lang="en-US" smtClean="0"/>
+              <a:rPr lang="en-US"/>
               <a:t>before the </a:t>
             </a:r>
             <a:r>
-              <a:rPr lang="en-US" dirty="0" smtClean="0"/>
+              <a:rPr lang="en-US" dirty="0"/>
               <a:t>insurance organization will paid the member’s providers for that member’s claims.  Therefore:</a:t>
             </a:r>
           </a:p>
@@ -7102,34 +7609,26 @@
             <a:pPr lvl="1"/>
             <a:r>
               <a:rPr lang="en-US" dirty="0"/>
-              <a:t>E</a:t>
-            </a:r>
-            <a:r>
-              <a:rPr lang="en-US" dirty="0" smtClean="0"/>
-              <a:t>very enrollment record can be mapped to a single product record</a:t>
+              <a:t>Every enrollment record can be mapped to a single product record</a:t>
             </a:r>
           </a:p>
           <a:p>
             <a:pPr lvl="1"/>
             <a:r>
               <a:rPr lang="en-US" dirty="0"/>
-              <a:t>E</a:t>
-            </a:r>
-            <a:r>
-              <a:rPr lang="en-US" dirty="0" smtClean="0"/>
-              <a:t>very medical and pharmacy claim can be linked to a single enrollment record</a:t>
+              <a:t>Every medical and pharmacy claim can be linked to a single enrollment record</a:t>
             </a:r>
           </a:p>
           <a:p>
             <a:pPr lvl="1"/>
             <a:r>
-              <a:rPr lang="en-US" dirty="0" smtClean="0"/>
+              <a:rPr lang="en-US" dirty="0"/>
               <a:t>Since claims can be mapped to enrollment records, they can be mapped to the members active Primary Care Physician (PCP).</a:t>
             </a:r>
           </a:p>
           <a:p>
             <a:r>
-              <a:rPr lang="en-US" dirty="0" smtClean="0"/>
+              <a:rPr lang="en-US" dirty="0"/>
               <a:t>The Member Eligibility data is the key to linking claims, products and PCPs!</a:t>
             </a:r>
           </a:p>
@@ -7138,6 +7637,39 @@
           </a:p>
         </p:txBody>
       </p:sp>
+      <p:pic>
+        <p:nvPicPr>
+          <p:cNvPr id="4" name="Audio 3">
+            <a:hlinkClick r:id="" action="ppaction://media"/>
+          </p:cNvPr>
+          <p:cNvPicPr>
+            <a:picLocks noChangeAspect="1"/>
+          </p:cNvPicPr>
+          <p:nvPr>
+            <a:audioFile r:link="rId2"/>
+            <p:extLst>
+              <p:ext uri="{DAA4B4D4-6D71-4841-9C94-3DE7FCFB9230}">
+                <p14:media xmlns:p14="http://schemas.microsoft.com/office/powerpoint/2010/main" r:embed="rId1"/>
+              </p:ext>
+            </p:extLst>
+          </p:nvPr>
+        </p:nvPicPr>
+        <p:blipFill>
+          <a:blip r:embed="rId4"/>
+          <a:stretch>
+            <a:fillRect/>
+          </a:stretch>
+        </p:blipFill>
+        <p:spPr>
+          <a:xfrm>
+            <a:off x="12766431" y="6178062"/>
+            <a:ext cx="609600" cy="609600"/>
+          </a:xfrm>
+          <a:prstGeom prst="rect">
+            <a:avLst/>
+          </a:prstGeom>
+        </p:spPr>
+      </p:pic>
     </p:spTree>
     <p:extLst>
       <p:ext uri="{BB962C8B-B14F-4D97-AF65-F5344CB8AC3E}">
@@ -7148,6 +7680,101 @@
   <p:clrMapOvr>
     <a:masterClrMapping/>
   </p:clrMapOvr>
+  <mc:AlternateContent xmlns:mc="http://schemas.openxmlformats.org/markup-compatibility/2006" xmlns:p14="http://schemas.microsoft.com/office/powerpoint/2010/main">
+    <mc:Choice Requires="p14">
+      <p:transition spd="slow" p14:dur="2000" advTm="41604"/>
+    </mc:Choice>
+    <mc:Fallback xmlns="">
+      <p:transition spd="slow" advTm="41604"/>
+    </mc:Fallback>
+  </mc:AlternateContent>
+  <p:timing>
+    <p:tnLst>
+      <p:par>
+        <p:cTn id="1" dur="indefinite" restart="never" nodeType="tmRoot">
+          <p:childTnLst>
+            <p:seq concurrent="1" nextAc="seek">
+              <p:cTn id="2" dur="indefinite" nodeType="mainSeq">
+                <p:childTnLst>
+                  <p:par>
+                    <p:cTn id="3" fill="hold">
+                      <p:stCondLst>
+                        <p:cond delay="indefinite"/>
+                        <p:cond evt="onBegin" delay="0">
+                          <p:tn val="2"/>
+                        </p:cond>
+                      </p:stCondLst>
+                      <p:childTnLst>
+                        <p:par>
+                          <p:cTn id="4" fill="hold">
+                            <p:stCondLst>
+                              <p:cond delay="0"/>
+                            </p:stCondLst>
+                            <p:childTnLst>
+                              <p:par>
+                                <p:cTn id="5" presetID="1" presetClass="mediacall" presetSubtype="0" fill="hold" nodeType="afterEffect">
+                                  <p:stCondLst>
+                                    <p:cond delay="0"/>
+                                  </p:stCondLst>
+                                  <p:childTnLst>
+                                    <p:cmd type="call" cmd="playFrom(0.0)">
+                                      <p:cBhvr>
+                                        <p:cTn id="6" dur="1" fill="hold"/>
+                                        <p:tgtEl>
+                                          <p:spTgt spid="4"/>
+                                        </p:tgtEl>
+                                      </p:cBhvr>
+                                    </p:cmd>
+                                  </p:childTnLst>
+                                </p:cTn>
+                              </p:par>
+                            </p:childTnLst>
+                          </p:cTn>
+                        </p:par>
+                      </p:childTnLst>
+                    </p:cTn>
+                  </p:par>
+                </p:childTnLst>
+              </p:cTn>
+              <p:prevCondLst>
+                <p:cond evt="onPrev" delay="0">
+                  <p:tgtEl>
+                    <p:sldTgt/>
+                  </p:tgtEl>
+                </p:cond>
+              </p:prevCondLst>
+              <p:nextCondLst>
+                <p:cond evt="onNext" delay="0">
+                  <p:tgtEl>
+                    <p:sldTgt/>
+                  </p:tgtEl>
+                </p:cond>
+              </p:nextCondLst>
+            </p:seq>
+            <p:audio isNarration="1">
+              <p:cMediaNode vol="80000" showWhenStopped="0">
+                <p:cTn id="7" fill="hold" display="0">
+                  <p:stCondLst>
+                    <p:cond delay="indefinite"/>
+                  </p:stCondLst>
+                  <p:endCondLst>
+                    <p:cond evt="onStopAudio" delay="0">
+                      <p:tgtEl>
+                        <p:sldTgt/>
+                      </p:tgtEl>
+                    </p:cond>
+                  </p:endCondLst>
+                </p:cTn>
+                <p:tgtEl>
+                  <p:spTgt spid="4"/>
+                </p:tgtEl>
+              </p:cMediaNode>
+            </p:audio>
+          </p:childTnLst>
+        </p:cTn>
+      </p:par>
+    </p:tnLst>
+  </p:timing>
 </p:sld>
 </file>
 
@@ -7184,10 +7811,9 @@
           <a:lstStyle/>
           <a:p>
             <a:r>
-              <a:rPr lang="en-US" dirty="0" smtClean="0"/>
+              <a:rPr lang="en-US" dirty="0"/>
               <a:t>References</a:t>
             </a:r>
-            <a:endParaRPr lang="en-US" dirty="0"/>
           </a:p>
         </p:txBody>
       </p:sp>
@@ -7210,15 +7836,9 @@
               <a:rPr lang="en-US" dirty="0">
                 <a:hlinkClick r:id="rId2"/>
               </a:rPr>
-              <a:t>http://</a:t>
-            </a:r>
-            <a:r>
-              <a:rPr lang="en-US" dirty="0" smtClean="0">
-                <a:hlinkClick r:id="rId2"/>
-              </a:rPr>
-              <a:t>www.chiamass.gov/assets/docs/p/apcd/submission-guides/version-5.0/v5-apcd-member-eligibility-file-submission-guide-FINAL.pdf</a:t>
-            </a:r>
-            <a:endParaRPr lang="en-US" dirty="0" smtClean="0"/>
+              <a:t>http://www.chiamass.gov/assets/docs/p/apcd/submission-guides/version-5.0/v5-apcd-member-eligibility-file-submission-guide-FINAL.pdf</a:t>
+            </a:r>
+            <a:endParaRPr lang="en-US" dirty="0"/>
           </a:p>
           <a:p>
             <a:endParaRPr lang="en-US" dirty="0"/>
@@ -7235,6 +7855,14 @@
   <p:clrMapOvr>
     <a:masterClrMapping/>
   </p:clrMapOvr>
+  <mc:AlternateContent xmlns:mc="http://schemas.openxmlformats.org/markup-compatibility/2006" xmlns:p14="http://schemas.microsoft.com/office/powerpoint/2010/main">
+    <mc:Choice Requires="p14">
+      <p:transition spd="slow" p14:dur="2000" advTm="4762"/>
+    </mc:Choice>
+    <mc:Fallback xmlns="">
+      <p:transition spd="slow" advTm="4762"/>
+    </mc:Fallback>
+  </mc:AlternateContent>
 </p:sld>
 </file>
 
@@ -7738,7 +8366,7 @@
   <a:extraClrSchemeLst/>
   <a:extLst>
     <a:ext uri="{05A4C25C-085E-4340-85A3-A5531E510DB2}">
-      <thm15:themeFamily xmlns:thm15="http://schemas.microsoft.com/office/thememl/2012/main" xmlns="" name="Gallery" id="{BBFCD31E-59A1-489D-B089-A3EAD7CAE12E}" vid="{AC464412-510E-4F2B-8947-A0DDBD028997}"/>
+      <thm15:themeFamily xmlns:thm15="http://schemas.microsoft.com/office/thememl/2012/main" name="Gallery" id="{BBFCD31E-59A1-489D-B089-A3EAD7CAE12E}" vid="{AC464412-510E-4F2B-8947-A0DDBD028997}"/>
     </a:ext>
   </a:extLst>
 </a:theme>

</xml_diff>